<commit_message>
adding QRcodes to poster
</commit_message>
<xml_diff>
--- a/mjmaslow/SYE-Poster_Maslow.pptx
+++ b/mjmaslow/SYE-Poster_Maslow.pptx
@@ -3514,7 +3514,7 @@
         </p:nvSpPr>
         <p:spPr>
           <a:xfrm>
-            <a:off x="15456297" y="15541479"/>
+            <a:off x="15356824" y="14322279"/>
             <a:ext cx="13127749" cy="14557831"/>
           </a:xfrm>
           <a:prstGeom prst="rect">
@@ -3777,7 +3777,7 @@
         </p:blipFill>
         <p:spPr bwMode="auto">
           <a:xfrm>
-            <a:off x="16644569" y="7591916"/>
+            <a:off x="16644569" y="6825876"/>
             <a:ext cx="10401300" cy="7797800"/>
           </a:xfrm>
           <a:prstGeom prst="rect">
@@ -3793,6 +3793,66 @@
               </a14:hiddenFill>
             </a:ext>
           </a:extLst>
+        </p:spPr>
+      </p:pic>
+      <p:pic>
+        <p:nvPicPr>
+          <p:cNvPr id="12" name="Picture 11" descr="A qr code with a white background&#10;&#10;Description automatically generated">
+            <a:extLst>
+              <a:ext uri="{FF2B5EF4-FFF2-40B4-BE49-F238E27FC236}">
+                <a16:creationId xmlns:a16="http://schemas.microsoft.com/office/drawing/2014/main" id="{766B1B9D-8833-8114-71A9-B3A987E97095}"/>
+              </a:ext>
+            </a:extLst>
+          </p:cNvPr>
+          <p:cNvPicPr>
+            <a:picLocks noChangeAspect="1"/>
+          </p:cNvPicPr>
+          <p:nvPr/>
+        </p:nvPicPr>
+        <p:blipFill>
+          <a:blip r:embed="rId6"/>
+          <a:stretch>
+            <a:fillRect/>
+          </a:stretch>
+        </p:blipFill>
+        <p:spPr>
+          <a:xfrm>
+            <a:off x="4246886" y="25984510"/>
+            <a:ext cx="6667500" cy="4114800"/>
+          </a:xfrm>
+          <a:prstGeom prst="rect">
+            <a:avLst/>
+          </a:prstGeom>
+        </p:spPr>
+      </p:pic>
+      <p:pic>
+        <p:nvPicPr>
+          <p:cNvPr id="14" name="Picture 13" descr="A qr code with a white background&#10;&#10;Description automatically generated">
+            <a:extLst>
+              <a:ext uri="{FF2B5EF4-FFF2-40B4-BE49-F238E27FC236}">
+                <a16:creationId xmlns:a16="http://schemas.microsoft.com/office/drawing/2014/main" id="{41E62472-51D5-0D8F-908A-25C9287FDBF2}"/>
+              </a:ext>
+            </a:extLst>
+          </p:cNvPr>
+          <p:cNvPicPr>
+            <a:picLocks noChangeAspect="1"/>
+          </p:cNvPicPr>
+          <p:nvPr/>
+        </p:nvPicPr>
+        <p:blipFill>
+          <a:blip r:embed="rId7"/>
+          <a:stretch>
+            <a:fillRect/>
+          </a:stretch>
+        </p:blipFill>
+        <p:spPr>
+          <a:xfrm>
+            <a:off x="33010640" y="25984510"/>
+            <a:ext cx="6667500" cy="4114800"/>
+          </a:xfrm>
+          <a:prstGeom prst="rect">
+            <a:avLst/>
+          </a:prstGeom>
         </p:spPr>
       </p:pic>
     </p:spTree>

</xml_diff>